<commit_message>
window graph generation code
</commit_message>
<xml_diff>
--- a/Progress/4 Project Progress.pptx
+++ b/Progress/4 Project Progress.pptx
@@ -163,7 +163,7 @@
 <file path=ppt/revisionInfo.xml><?xml version="1.0" encoding="utf-8"?>
 <p1510:revInfo xmlns:a="http://schemas.openxmlformats.org/drawingml/2006/main" xmlns:r="http://schemas.openxmlformats.org/officeDocument/2006/relationships" xmlns:p1510="http://schemas.microsoft.com/office/powerpoint/2015/10/main">
   <p1510:revLst>
-    <p1510:client id="{B4B89666-A1A6-4720-8063-C08652289BBA}" v="11" dt="2023-06-13T11:48:58.838"/>
+    <p1510:client id="{CADDE75A-7E31-4B6F-B596-AB84AE6D1069}" v="2" dt="2023-08-02T08:52:37.963"/>
   </p1510:revLst>
 </p1510:revInfo>
 </file>
@@ -664,6 +664,38 @@
       </pc:sldChg>
     </pc:docChg>
   </pc:docChgLst>
+  <pc:docChgLst>
+    <pc:chgData name="Kyriacos Kyriacou" userId="6a303e1966778a2b" providerId="LiveId" clId="{CADDE75A-7E31-4B6F-B596-AB84AE6D1069}"/>
+    <pc:docChg chg="undo custSel modSld">
+      <pc:chgData name="Kyriacos Kyriacou" userId="6a303e1966778a2b" providerId="LiveId" clId="{CADDE75A-7E31-4B6F-B596-AB84AE6D1069}" dt="2023-08-02T08:52:37.963" v="9"/>
+      <pc:docMkLst>
+        <pc:docMk/>
+      </pc:docMkLst>
+      <pc:sldChg chg="addSp delSp modSp mod">
+        <pc:chgData name="Kyriacos Kyriacou" userId="6a303e1966778a2b" providerId="LiveId" clId="{CADDE75A-7E31-4B6F-B596-AB84AE6D1069}" dt="2023-08-02T08:52:37.963" v="9"/>
+        <pc:sldMkLst>
+          <pc:docMk/>
+          <pc:sldMk cId="4160024208" sldId="259"/>
+        </pc:sldMkLst>
+        <pc:picChg chg="add del mod modCrop">
+          <ac:chgData name="Kyriacos Kyriacou" userId="6a303e1966778a2b" providerId="LiveId" clId="{CADDE75A-7E31-4B6F-B596-AB84AE6D1069}" dt="2023-08-02T08:52:37.963" v="9"/>
+          <ac:picMkLst>
+            <pc:docMk/>
+            <pc:sldMk cId="4160024208" sldId="259"/>
+            <ac:picMk id="3" creationId="{17539878-075D-96C7-5301-3CE375D0D7A6}"/>
+          </ac:picMkLst>
+        </pc:picChg>
+        <pc:picChg chg="mod modCrop">
+          <ac:chgData name="Kyriacos Kyriacou" userId="6a303e1966778a2b" providerId="LiveId" clId="{CADDE75A-7E31-4B6F-B596-AB84AE6D1069}" dt="2023-08-02T08:52:37.216" v="5" actId="732"/>
+          <ac:picMkLst>
+            <pc:docMk/>
+            <pc:sldMk cId="4160024208" sldId="259"/>
+            <ac:picMk id="6" creationId="{18FEDC09-11E6-21FC-F993-C06772A332EB}"/>
+          </ac:picMkLst>
+        </pc:picChg>
+      </pc:sldChg>
+    </pc:docChg>
+  </pc:docChgLst>
 </pc:chgInfo>
 </file>
 
@@ -862,7 +894,7 @@
               <a:pPr>
                 <a:defRPr/>
               </a:pPr>
-              <a:t>6/13/2023</a:t>
+              <a:t>8/2/2023</a:t>
             </a:fld>
             <a:endParaRPr lang="en-US" altLang="en-US"/>
           </a:p>
@@ -1054,7 +1086,7 @@
               <a:pPr>
                 <a:defRPr/>
               </a:pPr>
-              <a:t>6/13/2023</a:t>
+              <a:t>8/2/2023</a:t>
             </a:fld>
             <a:endParaRPr lang="en-US" altLang="en-US"/>
           </a:p>
@@ -1256,7 +1288,7 @@
               <a:pPr>
                 <a:defRPr/>
               </a:pPr>
-              <a:t>6/13/2023</a:t>
+              <a:t>8/2/2023</a:t>
             </a:fld>
             <a:endParaRPr lang="en-US" altLang="en-US"/>
           </a:p>
@@ -1448,7 +1480,7 @@
               <a:pPr>
                 <a:defRPr/>
               </a:pPr>
-              <a:t>6/13/2023</a:t>
+              <a:t>8/2/2023</a:t>
             </a:fld>
             <a:endParaRPr lang="en-US" altLang="en-US"/>
           </a:p>
@@ -1716,7 +1748,7 @@
               <a:pPr>
                 <a:defRPr/>
               </a:pPr>
-              <a:t>6/13/2023</a:t>
+              <a:t>8/2/2023</a:t>
             </a:fld>
             <a:endParaRPr lang="en-US" altLang="en-US"/>
           </a:p>
@@ -2026,7 +2058,7 @@
               <a:pPr>
                 <a:defRPr/>
               </a:pPr>
-              <a:t>6/13/2023</a:t>
+              <a:t>8/2/2023</a:t>
             </a:fld>
             <a:endParaRPr lang="en-US" altLang="en-US"/>
           </a:p>
@@ -2470,7 +2502,7 @@
               <a:pPr>
                 <a:defRPr/>
               </a:pPr>
-              <a:t>6/13/2023</a:t>
+              <a:t>8/2/2023</a:t>
             </a:fld>
             <a:endParaRPr lang="en-US" altLang="en-US"/>
           </a:p>
@@ -2610,7 +2642,7 @@
               <a:pPr>
                 <a:defRPr/>
               </a:pPr>
-              <a:t>6/13/2023</a:t>
+              <a:t>8/2/2023</a:t>
             </a:fld>
             <a:endParaRPr lang="en-US" altLang="en-US"/>
           </a:p>
@@ -2727,7 +2759,7 @@
               <a:pPr>
                 <a:defRPr/>
               </a:pPr>
-              <a:t>6/13/2023</a:t>
+              <a:t>8/2/2023</a:t>
             </a:fld>
             <a:endParaRPr lang="en-US" altLang="en-US"/>
           </a:p>
@@ -3026,7 +3058,7 @@
               <a:pPr>
                 <a:defRPr/>
               </a:pPr>
-              <a:t>6/13/2023</a:t>
+              <a:t>8/2/2023</a:t>
             </a:fld>
             <a:endParaRPr lang="en-US" altLang="en-US"/>
           </a:p>
@@ -3308,7 +3340,7 @@
               <a:pPr>
                 <a:defRPr/>
               </a:pPr>
-              <a:t>6/13/2023</a:t>
+              <a:t>8/2/2023</a:t>
             </a:fld>
             <a:endParaRPr lang="en-US" altLang="en-US"/>
           </a:p>
@@ -3599,7 +3631,7 @@
               <a:pPr>
                 <a:defRPr/>
               </a:pPr>
-              <a:t>6/13/2023</a:t>
+              <a:t>8/2/2023</a:t>
             </a:fld>
             <a:endParaRPr lang="en-US" altLang="en-US"/>
           </a:p>

</xml_diff>